<commit_message>
feat: extended grammar fuzzer und runner from sl with grammar for datetime (except leap year) and tested it
</commit_message>
<xml_diff>
--- a/NumPy_Fuzzer_Presentation.pptx
+++ b/NumPy_Fuzzer_Presentation.pptx
@@ -343,7 +343,7 @@
             <a:fld id="{5586B75A-687E-405C-8A0B-8D00578BA2C3}" type="datetimeFigureOut">
               <a:rPr lang="en-US" dirty="0"/>
               <a:pPr/>
-              <a:t>7/4/2024</a:t>
+              <a:t>7/5/24</a:t>
             </a:fld>
             <a:endParaRPr lang="en-US" dirty="0"/>
           </a:p>
@@ -510,7 +510,7 @@
             <a:fld id="{5586B75A-687E-405C-8A0B-8D00578BA2C3}" type="datetimeFigureOut">
               <a:rPr lang="en-US" dirty="0"/>
               <a:pPr/>
-              <a:t>7/4/2024</a:t>
+              <a:t>7/5/24</a:t>
             </a:fld>
             <a:endParaRPr lang="en-US" dirty="0"/>
           </a:p>
@@ -687,7 +687,7 @@
             <a:fld id="{5586B75A-687E-405C-8A0B-8D00578BA2C3}" type="datetimeFigureOut">
               <a:rPr lang="en-US" dirty="0"/>
               <a:pPr/>
-              <a:t>7/4/2024</a:t>
+              <a:t>7/5/24</a:t>
             </a:fld>
             <a:endParaRPr lang="en-US" dirty="0"/>
           </a:p>
@@ -854,7 +854,7 @@
             <a:fld id="{5586B75A-687E-405C-8A0B-8D00578BA2C3}" type="datetimeFigureOut">
               <a:rPr lang="en-US" dirty="0"/>
               <a:pPr/>
-              <a:t>7/4/2024</a:t>
+              <a:t>7/5/24</a:t>
             </a:fld>
             <a:endParaRPr lang="en-US" dirty="0"/>
           </a:p>
@@ -1109,7 +1109,7 @@
             <a:fld id="{5586B75A-687E-405C-8A0B-8D00578BA2C3}" type="datetimeFigureOut">
               <a:rPr lang="en-US" dirty="0"/>
               <a:pPr/>
-              <a:t>7/4/2024</a:t>
+              <a:t>7/5/24</a:t>
             </a:fld>
             <a:endParaRPr lang="en-US" dirty="0"/>
           </a:p>
@@ -1394,7 +1394,7 @@
             <a:fld id="{5586B75A-687E-405C-8A0B-8D00578BA2C3}" type="datetimeFigureOut">
               <a:rPr lang="en-US" dirty="0"/>
               <a:pPr/>
-              <a:t>7/4/2024</a:t>
+              <a:t>7/5/24</a:t>
             </a:fld>
             <a:endParaRPr lang="en-US" dirty="0"/>
           </a:p>
@@ -1833,7 +1833,7 @@
             <a:fld id="{5586B75A-687E-405C-8A0B-8D00578BA2C3}" type="datetimeFigureOut">
               <a:rPr lang="en-US" dirty="0"/>
               <a:pPr/>
-              <a:t>7/4/2024</a:t>
+              <a:t>7/5/24</a:t>
             </a:fld>
             <a:endParaRPr lang="en-US" dirty="0"/>
           </a:p>
@@ -1948,7 +1948,7 @@
             <a:fld id="{5586B75A-687E-405C-8A0B-8D00578BA2C3}" type="datetimeFigureOut">
               <a:rPr lang="en-US" dirty="0"/>
               <a:pPr/>
-              <a:t>7/4/2024</a:t>
+              <a:t>7/5/24</a:t>
             </a:fld>
             <a:endParaRPr lang="en-US" dirty="0"/>
           </a:p>
@@ -2040,7 +2040,7 @@
             <a:fld id="{5586B75A-687E-405C-8A0B-8D00578BA2C3}" type="datetimeFigureOut">
               <a:rPr lang="en-US" dirty="0"/>
               <a:pPr/>
-              <a:t>7/4/2024</a:t>
+              <a:t>7/5/24</a:t>
             </a:fld>
             <a:endParaRPr lang="en-US" dirty="0"/>
           </a:p>
@@ -2325,7 +2325,7 @@
             <a:fld id="{5586B75A-687E-405C-8A0B-8D00578BA2C3}" type="datetimeFigureOut">
               <a:rPr lang="en-US" dirty="0"/>
               <a:pPr/>
-              <a:t>7/4/2024</a:t>
+              <a:t>7/5/24</a:t>
             </a:fld>
             <a:endParaRPr lang="en-US" dirty="0"/>
           </a:p>
@@ -2595,7 +2595,7 @@
             <a:fld id="{5586B75A-687E-405C-8A0B-8D00578BA2C3}" type="datetimeFigureOut">
               <a:rPr lang="en-US" dirty="0"/>
               <a:pPr/>
-              <a:t>7/4/2024</a:t>
+              <a:t>7/5/24</a:t>
             </a:fld>
             <a:endParaRPr lang="en-US" dirty="0"/>
           </a:p>
@@ -2889,7 +2889,7 @@
             <a:fld id="{5586B75A-687E-405C-8A0B-8D00578BA2C3}" type="datetimeFigureOut">
               <a:rPr lang="en-US" dirty="0"/>
               <a:pPr/>
-              <a:t>7/4/2024</a:t>
+              <a:t>7/5/24</a:t>
             </a:fld>
             <a:endParaRPr lang="en-US" dirty="0"/>
           </a:p>
@@ -3572,6 +3572,51 @@
               <a:t>)</a:t>
             </a:r>
           </a:p>
+          <a:p>
+            <a:r>
+              <a:rPr lang="de-DE" i="0" u="none" strike="noStrike" dirty="0" err="1">
+                <a:solidFill>
+                  <a:srgbClr val="222832"/>
+                </a:solidFill>
+                <a:effectLst/>
+                <a:latin typeface="var(--pst-font-family-heading)"/>
+              </a:rPr>
+              <a:t>Datetimes</a:t>
+            </a:r>
+            <a:r>
+              <a:rPr lang="de-DE" i="0" u="none" strike="noStrike" dirty="0">
+                <a:solidFill>
+                  <a:srgbClr val="222832"/>
+                </a:solidFill>
+                <a:effectLst/>
+                <a:latin typeface="var(--pst-font-family-heading)"/>
+              </a:rPr>
+              <a:t> and </a:t>
+            </a:r>
+            <a:r>
+              <a:rPr lang="de-DE" i="0" u="none" strike="noStrike" dirty="0" err="1">
+                <a:solidFill>
+                  <a:srgbClr val="222832"/>
+                </a:solidFill>
+                <a:effectLst/>
+                <a:latin typeface="var(--pst-font-family-heading)"/>
+              </a:rPr>
+              <a:t>timedeltas</a:t>
+            </a:r>
+            <a:endParaRPr lang="de-DE" i="0" u="none" strike="noStrike" dirty="0">
+              <a:solidFill>
+                <a:srgbClr val="222832"/>
+              </a:solidFill>
+              <a:effectLst/>
+              <a:latin typeface="var(--pst-font-family-heading)"/>
+            </a:endParaRPr>
+          </a:p>
+          <a:p>
+            <a:endParaRPr lang="de-DE" dirty="0">
+              <a:latin typeface="Arial" panose="020B0604020202020204" pitchFamily="34" charset="0"/>
+              <a:cs typeface="Arial" panose="020B0604020202020204" pitchFamily="34" charset="0"/>
+            </a:endParaRPr>
+          </a:p>
         </p:txBody>
       </p:sp>
       <p:pic>
@@ -3757,11 +3802,28 @@
           <a:p>
             <a:pPr lvl="1"/>
             <a:r>
+              <a:rPr lang="en-US" dirty="0" err="1">
+                <a:latin typeface="Arial" panose="020B0604020202020204" pitchFamily="34" charset="0"/>
+                <a:cs typeface="Arial" panose="020B0604020202020204" pitchFamily="34" charset="0"/>
+              </a:rPr>
+              <a:t>ufunc</a:t>
+            </a:r>
+            <a:r>
               <a:rPr lang="en-US" dirty="0">
                 <a:latin typeface="Arial" panose="020B0604020202020204" pitchFamily="34" charset="0"/>
                 <a:cs typeface="Arial" panose="020B0604020202020204" pitchFamily="34" charset="0"/>
               </a:rPr>
-              <a:t>experimental approach</a:t>
+              <a:t> (with input) generation</a:t>
+            </a:r>
+          </a:p>
+          <a:p>
+            <a:pPr lvl="1"/>
+            <a:r>
+              <a:rPr lang="en-US" dirty="0">
+                <a:latin typeface="Arial" panose="020B0604020202020204" pitchFamily="34" charset="0"/>
+                <a:cs typeface="Arial" panose="020B0604020202020204" pitchFamily="34" charset="0"/>
+              </a:rPr>
+              <a:t>datetime and timespans</a:t>
             </a:r>
           </a:p>
         </p:txBody>

</xml_diff>